<commit_message>
Updated comments and data flow diagrams and seaprated code used to create lasar file with element names into separate code for reference.
</commit_message>
<xml_diff>
--- a/01_data_compilation_DataFlowDiagram.pptx
+++ b/01_data_compilation_DataFlowDiagram.pptx
@@ -192,7 +192,8 @@
           <a:p>
             <a:fld id="{B745E5C5-176D-4490-9E2B-4824397A260F}" type="datetimeFigureOut">
               <a:rPr lang="en-US" smtClean="0"/>
-              <a:t>2/10/2014</a:t>
+              <a:pPr/>
+              <a:t>2/27/2014</a:t>
             </a:fld>
             <a:endParaRPr lang="en-US"/>
           </a:p>
@@ -353,6 +354,7 @@
           <a:p>
             <a:fld id="{F7D49702-09A8-4B7C-A318-BF212818E3D1}" type="slidenum">
               <a:rPr lang="en-US" smtClean="0"/>
+              <a:pPr/>
               <a:t>‹#›</a:t>
             </a:fld>
             <a:endParaRPr lang="en-US"/>
@@ -524,6 +526,7 @@
           <a:p>
             <a:fld id="{F7D49702-09A8-4B7C-A318-BF212818E3D1}" type="slidenum">
               <a:rPr lang="en-US" smtClean="0"/>
+              <a:pPr/>
               <a:t>1</a:t>
             </a:fld>
             <a:endParaRPr lang="en-US"/>
@@ -719,7 +722,8 @@
           <a:p>
             <a:fld id="{1230F75C-E365-4168-9581-EA571DF1724F}" type="datetimeFigureOut">
               <a:rPr lang="en-US" smtClean="0"/>
-              <a:t>2/10/2014</a:t>
+              <a:pPr/>
+              <a:t>2/27/2014</a:t>
             </a:fld>
             <a:endParaRPr lang="en-US"/>
           </a:p>
@@ -761,6 +765,7 @@
           <a:p>
             <a:fld id="{66C85ABD-A8E7-4D2C-81A8-500E9A63AD2F}" type="slidenum">
               <a:rPr lang="en-US" smtClean="0"/>
+              <a:pPr/>
               <a:t>‹#›</a:t>
             </a:fld>
             <a:endParaRPr lang="en-US"/>
@@ -884,7 +889,8 @@
           <a:p>
             <a:fld id="{1230F75C-E365-4168-9581-EA571DF1724F}" type="datetimeFigureOut">
               <a:rPr lang="en-US" smtClean="0"/>
-              <a:t>2/10/2014</a:t>
+              <a:pPr/>
+              <a:t>2/27/2014</a:t>
             </a:fld>
             <a:endParaRPr lang="en-US"/>
           </a:p>
@@ -926,6 +932,7 @@
           <a:p>
             <a:fld id="{66C85ABD-A8E7-4D2C-81A8-500E9A63AD2F}" type="slidenum">
               <a:rPr lang="en-US" smtClean="0"/>
+              <a:pPr/>
               <a:t>‹#›</a:t>
             </a:fld>
             <a:endParaRPr lang="en-US"/>
@@ -1059,7 +1066,8 @@
           <a:p>
             <a:fld id="{1230F75C-E365-4168-9581-EA571DF1724F}" type="datetimeFigureOut">
               <a:rPr lang="en-US" smtClean="0"/>
-              <a:t>2/10/2014</a:t>
+              <a:pPr/>
+              <a:t>2/27/2014</a:t>
             </a:fld>
             <a:endParaRPr lang="en-US"/>
           </a:p>
@@ -1101,6 +1109,7 @@
           <a:p>
             <a:fld id="{66C85ABD-A8E7-4D2C-81A8-500E9A63AD2F}" type="slidenum">
               <a:rPr lang="en-US" smtClean="0"/>
+              <a:pPr/>
               <a:t>‹#›</a:t>
             </a:fld>
             <a:endParaRPr lang="en-US"/>
@@ -1224,7 +1233,8 @@
           <a:p>
             <a:fld id="{1230F75C-E365-4168-9581-EA571DF1724F}" type="datetimeFigureOut">
               <a:rPr lang="en-US" smtClean="0"/>
-              <a:t>2/10/2014</a:t>
+              <a:pPr/>
+              <a:t>2/27/2014</a:t>
             </a:fld>
             <a:endParaRPr lang="en-US"/>
           </a:p>
@@ -1266,6 +1276,7 @@
           <a:p>
             <a:fld id="{66C85ABD-A8E7-4D2C-81A8-500E9A63AD2F}" type="slidenum">
               <a:rPr lang="en-US" smtClean="0"/>
+              <a:pPr/>
               <a:t>‹#›</a:t>
             </a:fld>
             <a:endParaRPr lang="en-US"/>
@@ -1465,7 +1476,8 @@
           <a:p>
             <a:fld id="{1230F75C-E365-4168-9581-EA571DF1724F}" type="datetimeFigureOut">
               <a:rPr lang="en-US" smtClean="0"/>
-              <a:t>2/10/2014</a:t>
+              <a:pPr/>
+              <a:t>2/27/2014</a:t>
             </a:fld>
             <a:endParaRPr lang="en-US"/>
           </a:p>
@@ -1507,6 +1519,7 @@
           <a:p>
             <a:fld id="{66C85ABD-A8E7-4D2C-81A8-500E9A63AD2F}" type="slidenum">
               <a:rPr lang="en-US" smtClean="0"/>
+              <a:pPr/>
               <a:t>‹#›</a:t>
             </a:fld>
             <a:endParaRPr lang="en-US"/>
@@ -1748,7 +1761,8 @@
           <a:p>
             <a:fld id="{1230F75C-E365-4168-9581-EA571DF1724F}" type="datetimeFigureOut">
               <a:rPr lang="en-US" smtClean="0"/>
-              <a:t>2/10/2014</a:t>
+              <a:pPr/>
+              <a:t>2/27/2014</a:t>
             </a:fld>
             <a:endParaRPr lang="en-US"/>
           </a:p>
@@ -1790,6 +1804,7 @@
           <a:p>
             <a:fld id="{66C85ABD-A8E7-4D2C-81A8-500E9A63AD2F}" type="slidenum">
               <a:rPr lang="en-US" smtClean="0"/>
+              <a:pPr/>
               <a:t>‹#›</a:t>
             </a:fld>
             <a:endParaRPr lang="en-US"/>
@@ -2165,7 +2180,8 @@
           <a:p>
             <a:fld id="{1230F75C-E365-4168-9581-EA571DF1724F}" type="datetimeFigureOut">
               <a:rPr lang="en-US" smtClean="0"/>
-              <a:t>2/10/2014</a:t>
+              <a:pPr/>
+              <a:t>2/27/2014</a:t>
             </a:fld>
             <a:endParaRPr lang="en-US"/>
           </a:p>
@@ -2207,6 +2223,7 @@
           <a:p>
             <a:fld id="{66C85ABD-A8E7-4D2C-81A8-500E9A63AD2F}" type="slidenum">
               <a:rPr lang="en-US" smtClean="0"/>
+              <a:pPr/>
               <a:t>‹#›</a:t>
             </a:fld>
             <a:endParaRPr lang="en-US"/>
@@ -2278,7 +2295,8 @@
           <a:p>
             <a:fld id="{1230F75C-E365-4168-9581-EA571DF1724F}" type="datetimeFigureOut">
               <a:rPr lang="en-US" smtClean="0"/>
-              <a:t>2/10/2014</a:t>
+              <a:pPr/>
+              <a:t>2/27/2014</a:t>
             </a:fld>
             <a:endParaRPr lang="en-US"/>
           </a:p>
@@ -2320,6 +2338,7 @@
           <a:p>
             <a:fld id="{66C85ABD-A8E7-4D2C-81A8-500E9A63AD2F}" type="slidenum">
               <a:rPr lang="en-US" smtClean="0"/>
+              <a:pPr/>
               <a:t>‹#›</a:t>
             </a:fld>
             <a:endParaRPr lang="en-US"/>
@@ -2368,7 +2387,8 @@
           <a:p>
             <a:fld id="{1230F75C-E365-4168-9581-EA571DF1724F}" type="datetimeFigureOut">
               <a:rPr lang="en-US" smtClean="0"/>
-              <a:t>2/10/2014</a:t>
+              <a:pPr/>
+              <a:t>2/27/2014</a:t>
             </a:fld>
             <a:endParaRPr lang="en-US"/>
           </a:p>
@@ -2410,6 +2430,7 @@
           <a:p>
             <a:fld id="{66C85ABD-A8E7-4D2C-81A8-500E9A63AD2F}" type="slidenum">
               <a:rPr lang="en-US" smtClean="0"/>
+              <a:pPr/>
               <a:t>‹#›</a:t>
             </a:fld>
             <a:endParaRPr lang="en-US"/>
@@ -2640,7 +2661,8 @@
           <a:p>
             <a:fld id="{1230F75C-E365-4168-9581-EA571DF1724F}" type="datetimeFigureOut">
               <a:rPr lang="en-US" smtClean="0"/>
-              <a:t>2/10/2014</a:t>
+              <a:pPr/>
+              <a:t>2/27/2014</a:t>
             </a:fld>
             <a:endParaRPr lang="en-US"/>
           </a:p>
@@ -2682,6 +2704,7 @@
           <a:p>
             <a:fld id="{66C85ABD-A8E7-4D2C-81A8-500E9A63AD2F}" type="slidenum">
               <a:rPr lang="en-US" smtClean="0"/>
+              <a:pPr/>
               <a:t>‹#›</a:t>
             </a:fld>
             <a:endParaRPr lang="en-US"/>
@@ -2888,7 +2911,8 @@
           <a:p>
             <a:fld id="{1230F75C-E365-4168-9581-EA571DF1724F}" type="datetimeFigureOut">
               <a:rPr lang="en-US" smtClean="0"/>
-              <a:t>2/10/2014</a:t>
+              <a:pPr/>
+              <a:t>2/27/2014</a:t>
             </a:fld>
             <a:endParaRPr lang="en-US"/>
           </a:p>
@@ -2930,6 +2954,7 @@
           <a:p>
             <a:fld id="{66C85ABD-A8E7-4D2C-81A8-500E9A63AD2F}" type="slidenum">
               <a:rPr lang="en-US" smtClean="0"/>
+              <a:pPr/>
               <a:t>‹#›</a:t>
             </a:fld>
             <a:endParaRPr lang="en-US"/>
@@ -3096,7 +3121,8 @@
           <a:p>
             <a:fld id="{1230F75C-E365-4168-9581-EA571DF1724F}" type="datetimeFigureOut">
               <a:rPr lang="en-US" smtClean="0"/>
-              <a:t>2/10/2014</a:t>
+              <a:pPr/>
+              <a:t>2/27/2014</a:t>
             </a:fld>
             <a:endParaRPr lang="en-US"/>
           </a:p>
@@ -3174,6 +3200,7 @@
           <a:p>
             <a:fld id="{66C85ABD-A8E7-4D2C-81A8-500E9A63AD2F}" type="slidenum">
               <a:rPr lang="en-US" smtClean="0"/>
+              <a:pPr/>
               <a:t>‹#›</a:t>
             </a:fld>
             <a:endParaRPr lang="en-US"/>
@@ -3474,8 +3501,8 @@
         </p:nvSpPr>
         <p:spPr>
           <a:xfrm flipH="1">
-            <a:off x="304800" y="457200"/>
-            <a:ext cx="1905000" cy="1066800"/>
+            <a:off x="228600" y="76200"/>
+            <a:ext cx="1540564" cy="762000"/>
           </a:xfrm>
           <a:prstGeom prst="ellipse">
             <a:avLst/>
@@ -3504,14 +3531,22 @@
           <a:p>
             <a:pPr algn="ctr"/>
             <a:r>
-              <a:rPr lang="en-US" dirty="0" smtClean="0">
+              <a:rPr lang="en-US" sz="1000" dirty="0" smtClean="0">
                 <a:solidFill>
                   <a:schemeClr val="tx1"/>
                 </a:solidFill>
               </a:rPr>
-              <a:t>Element Data file</a:t>
-            </a:r>
-            <a:endParaRPr lang="en-US" dirty="0">
+              <a:t>Element </a:t>
+            </a:r>
+            <a:r>
+              <a:rPr lang="en-US" sz="1000" dirty="0" smtClean="0">
+                <a:solidFill>
+                  <a:schemeClr val="tx1"/>
+                </a:solidFill>
+              </a:rPr>
+              <a:t>Data (from SQL query)</a:t>
+            </a:r>
+            <a:endParaRPr lang="en-US" sz="1000" dirty="0">
               <a:solidFill>
                 <a:schemeClr val="tx1"/>
               </a:solidFill>
@@ -3527,8 +3562,8 @@
         </p:nvSpPr>
         <p:spPr>
           <a:xfrm>
-            <a:off x="457200" y="5486400"/>
-            <a:ext cx="1752600" cy="990600"/>
+            <a:off x="1143000" y="5486400"/>
+            <a:ext cx="1066799" cy="685800"/>
           </a:xfrm>
           <a:prstGeom prst="ellipse">
             <a:avLst/>
@@ -3557,14 +3592,14 @@
           <a:p>
             <a:pPr algn="ctr"/>
             <a:r>
-              <a:rPr lang="en-US" dirty="0" smtClean="0">
+              <a:rPr lang="en-US" sz="1000" dirty="0" smtClean="0">
                 <a:solidFill>
                   <a:schemeClr val="tx1"/>
                 </a:solidFill>
               </a:rPr>
               <a:t>Focus list categories</a:t>
             </a:r>
-            <a:endParaRPr lang="en-US" dirty="0">
+            <a:endParaRPr lang="en-US" sz="1000" dirty="0">
               <a:solidFill>
                 <a:schemeClr val="tx1"/>
               </a:solidFill>
@@ -3580,8 +3615,8 @@
         </p:nvSpPr>
         <p:spPr>
           <a:xfrm flipH="1">
-            <a:off x="6781800" y="2133600"/>
-            <a:ext cx="1981201" cy="1219200"/>
+            <a:off x="7557050" y="2133599"/>
+            <a:ext cx="1205948" cy="844062"/>
           </a:xfrm>
           <a:prstGeom prst="ellipse">
             <a:avLst/>
@@ -3610,14 +3645,14 @@
           <a:p>
             <a:pPr algn="ctr"/>
             <a:r>
-              <a:rPr lang="en-US" dirty="0" smtClean="0">
+              <a:rPr lang="en-US" sz="1000" dirty="0" smtClean="0">
                 <a:solidFill>
                   <a:schemeClr val="tx1"/>
                 </a:solidFill>
               </a:rPr>
               <a:t>LASAR to Element name mapping file</a:t>
             </a:r>
-            <a:endParaRPr lang="en-US" dirty="0">
+            <a:endParaRPr lang="en-US" sz="1000" dirty="0">
               <a:solidFill>
                 <a:schemeClr val="tx1"/>
               </a:solidFill>
@@ -3633,8 +3668,8 @@
         </p:nvSpPr>
         <p:spPr>
           <a:xfrm flipH="1">
-            <a:off x="2590800" y="304800"/>
-            <a:ext cx="1905000" cy="1143000"/>
+            <a:off x="4267200" y="152400"/>
+            <a:ext cx="1159564" cy="791308"/>
           </a:xfrm>
           <a:prstGeom prst="ellipse">
             <a:avLst/>
@@ -3663,14 +3698,14 @@
           <a:p>
             <a:pPr algn="ctr"/>
             <a:r>
-              <a:rPr lang="en-US" dirty="0" smtClean="0">
+              <a:rPr lang="en-US" sz="1000" dirty="0" smtClean="0">
                 <a:solidFill>
                   <a:schemeClr val="tx1"/>
                 </a:solidFill>
               </a:rPr>
               <a:t>Willamette metals data file</a:t>
             </a:r>
-            <a:endParaRPr lang="en-US" dirty="0">
+            <a:endParaRPr lang="en-US" sz="1000" dirty="0">
               <a:solidFill>
                 <a:schemeClr val="tx1"/>
               </a:solidFill>
@@ -3686,8 +3721,8 @@
         </p:nvSpPr>
         <p:spPr>
           <a:xfrm flipH="1">
-            <a:off x="4800600" y="457200"/>
-            <a:ext cx="1828800" cy="990600"/>
+            <a:off x="5867400" y="533400"/>
+            <a:ext cx="1113182" cy="685800"/>
           </a:xfrm>
           <a:prstGeom prst="ellipse">
             <a:avLst/>
@@ -3716,14 +3751,14 @@
           <a:p>
             <a:pPr algn="ctr"/>
             <a:r>
-              <a:rPr lang="en-US" dirty="0" smtClean="0">
+              <a:rPr lang="en-US" sz="1000" dirty="0" smtClean="0">
                 <a:solidFill>
                   <a:schemeClr val="tx1"/>
                 </a:solidFill>
               </a:rPr>
               <a:t>LASAR data file – 2011 data</a:t>
             </a:r>
-            <a:endParaRPr lang="en-US" dirty="0">
+            <a:endParaRPr lang="en-US" sz="1000" dirty="0">
               <a:solidFill>
                 <a:schemeClr val="tx1"/>
               </a:solidFill>
@@ -3739,8 +3774,8 @@
         </p:nvSpPr>
         <p:spPr>
           <a:xfrm flipH="1">
-            <a:off x="6857997" y="533400"/>
-            <a:ext cx="1828802" cy="1066800"/>
+            <a:off x="7573615" y="533400"/>
+            <a:ext cx="1113184" cy="738554"/>
           </a:xfrm>
           <a:prstGeom prst="ellipse">
             <a:avLst/>
@@ -3769,14 +3804,14 @@
           <a:p>
             <a:pPr algn="ctr"/>
             <a:r>
-              <a:rPr lang="en-US" dirty="0" smtClean="0">
+              <a:rPr lang="en-US" sz="1000" dirty="0" smtClean="0">
                 <a:solidFill>
                   <a:schemeClr val="tx1"/>
                 </a:solidFill>
               </a:rPr>
               <a:t>LASAR data file – Willy data</a:t>
             </a:r>
-            <a:endParaRPr lang="en-US" dirty="0">
+            <a:endParaRPr lang="en-US" sz="1000" dirty="0">
               <a:solidFill>
                 <a:schemeClr val="tx1"/>
               </a:solidFill>
@@ -3792,8 +3827,8 @@
         </p:nvSpPr>
         <p:spPr>
           <a:xfrm>
-            <a:off x="5334000" y="1752600"/>
-            <a:ext cx="1143000" cy="914400"/>
+            <a:off x="5781261" y="1752599"/>
+            <a:ext cx="695738" cy="633047"/>
           </a:xfrm>
           <a:prstGeom prst="rect">
             <a:avLst/>
@@ -3819,10 +3854,10 @@
           <a:p>
             <a:pPr algn="ctr"/>
             <a:r>
-              <a:rPr lang="en-US" dirty="0" smtClean="0"/>
+              <a:rPr lang="en-US" sz="1000" dirty="0" smtClean="0"/>
               <a:t>Combine</a:t>
             </a:r>
-            <a:endParaRPr lang="en-US" dirty="0"/>
+            <a:endParaRPr lang="en-US" sz="1000" dirty="0"/>
           </a:p>
         </p:txBody>
       </p:sp>
@@ -3836,9 +3871,9 @@
           <p:nvPr/>
         </p:nvCxnSpPr>
         <p:spPr>
-          <a:xfrm>
-            <a:off x="5715000" y="1447800"/>
-            <a:ext cx="190500" cy="304800"/>
+          <a:xfrm flipH="1">
+            <a:off x="6129130" y="1219200"/>
+            <a:ext cx="294861" cy="533399"/>
           </a:xfrm>
           <a:prstGeom prst="straightConnector1">
             <a:avLst/>
@@ -3873,8 +3908,8 @@
         </p:nvCxnSpPr>
         <p:spPr>
           <a:xfrm flipH="1">
-            <a:off x="6477000" y="1443971"/>
-            <a:ext cx="648819" cy="765829"/>
+            <a:off x="6476999" y="1163795"/>
+            <a:ext cx="1259638" cy="905328"/>
           </a:xfrm>
           <a:prstGeom prst="straightConnector1">
             <a:avLst/>
@@ -3906,8 +3941,8 @@
         </p:nvSpPr>
         <p:spPr>
           <a:xfrm flipH="1">
-            <a:off x="5029200" y="2819400"/>
-            <a:ext cx="1828802" cy="1066800"/>
+            <a:off x="5744818" y="2819400"/>
+            <a:ext cx="1113184" cy="738554"/>
           </a:xfrm>
           <a:prstGeom prst="ellipse">
             <a:avLst/>
@@ -3936,14 +3971,14 @@
           <a:p>
             <a:pPr algn="ctr"/>
             <a:r>
-              <a:rPr lang="en-US" dirty="0" smtClean="0">
+              <a:rPr lang="en-US" sz="1000" dirty="0" smtClean="0">
                 <a:solidFill>
                   <a:schemeClr val="tx1"/>
                 </a:solidFill>
               </a:rPr>
               <a:t>LASAR data</a:t>
             </a:r>
-            <a:endParaRPr lang="en-US" dirty="0">
+            <a:endParaRPr lang="en-US" sz="1000" dirty="0">
               <a:solidFill>
                 <a:schemeClr val="tx1"/>
               </a:solidFill>
@@ -3962,8 +3997,8 @@
         </p:nvCxnSpPr>
         <p:spPr>
           <a:xfrm>
-            <a:off x="5905500" y="2667000"/>
-            <a:ext cx="38101" cy="152400"/>
+            <a:off x="6129130" y="2385646"/>
+            <a:ext cx="172280" cy="433754"/>
           </a:xfrm>
           <a:prstGeom prst="straightConnector1">
             <a:avLst/>
@@ -3995,8 +4030,8 @@
         </p:nvSpPr>
         <p:spPr>
           <a:xfrm>
-            <a:off x="7010400" y="3657600"/>
-            <a:ext cx="1143000" cy="914400"/>
+            <a:off x="7457661" y="3657599"/>
+            <a:ext cx="695738" cy="633047"/>
           </a:xfrm>
           <a:prstGeom prst="rect">
             <a:avLst/>
@@ -4022,10 +4057,10 @@
           <a:p>
             <a:pPr algn="ctr"/>
             <a:r>
-              <a:rPr lang="en-US" dirty="0" smtClean="0"/>
+              <a:rPr lang="en-US" sz="1000" dirty="0" smtClean="0"/>
               <a:t>Rename</a:t>
             </a:r>
-            <a:endParaRPr lang="en-US" dirty="0"/>
+            <a:endParaRPr lang="en-US" sz="1000" dirty="0"/>
           </a:p>
         </p:txBody>
       </p:sp>
@@ -4040,8 +4075,8 @@
         </p:nvCxnSpPr>
         <p:spPr>
           <a:xfrm>
-            <a:off x="6858002" y="3352800"/>
-            <a:ext cx="723898" cy="304800"/>
+            <a:off x="6858002" y="3188677"/>
+            <a:ext cx="947528" cy="468922"/>
           </a:xfrm>
           <a:prstGeom prst="straightConnector1">
             <a:avLst/>
@@ -4076,8 +4111,8 @@
         </p:nvCxnSpPr>
         <p:spPr>
           <a:xfrm flipH="1">
-            <a:off x="7581900" y="3352800"/>
-            <a:ext cx="190500" cy="304800"/>
+            <a:off x="7805530" y="2977661"/>
+            <a:ext cx="354494" cy="679938"/>
           </a:xfrm>
           <a:prstGeom prst="straightConnector1">
             <a:avLst/>
@@ -4109,8 +4144,8 @@
         </p:nvSpPr>
         <p:spPr>
           <a:xfrm flipH="1">
-            <a:off x="4419600" y="3962400"/>
-            <a:ext cx="1828802" cy="1066800"/>
+            <a:off x="5181600" y="3581400"/>
+            <a:ext cx="1113184" cy="738554"/>
           </a:xfrm>
           <a:prstGeom prst="ellipse">
             <a:avLst/>
@@ -4139,14 +4174,14 @@
           <a:p>
             <a:pPr algn="ctr"/>
             <a:r>
-              <a:rPr lang="en-US" dirty="0" smtClean="0">
+              <a:rPr lang="en-US" sz="1000" dirty="0" smtClean="0">
                 <a:solidFill>
                   <a:schemeClr val="tx1"/>
                 </a:solidFill>
               </a:rPr>
               <a:t>LASAR data (w Element names)</a:t>
             </a:r>
-            <a:endParaRPr lang="en-US" dirty="0">
+            <a:endParaRPr lang="en-US" sz="1000" dirty="0">
               <a:solidFill>
                 <a:schemeClr val="tx1"/>
               </a:solidFill>
@@ -4159,14 +4194,14 @@
           <p:cNvPr id="39" name="Straight Arrow Connector 38"/>
           <p:cNvCxnSpPr>
             <a:stCxn id="30" idx="1"/>
-            <a:endCxn id="38" idx="1"/>
+            <a:endCxn id="38" idx="2"/>
           </p:cNvCxnSpPr>
           <p:nvPr/>
         </p:nvCxnSpPr>
         <p:spPr>
-          <a:xfrm flipH="1">
-            <a:off x="5980580" y="4114800"/>
-            <a:ext cx="1029820" cy="3829"/>
+          <a:xfrm flipH="1" flipV="1">
+            <a:off x="6294784" y="3950677"/>
+            <a:ext cx="1162877" cy="23446"/>
           </a:xfrm>
           <a:prstGeom prst="straightConnector1">
             <a:avLst/>
@@ -4198,8 +4233,8 @@
         </p:nvSpPr>
         <p:spPr>
           <a:xfrm>
-            <a:off x="2971800" y="1676400"/>
-            <a:ext cx="1143000" cy="914400"/>
+            <a:off x="4350028" y="1524000"/>
+            <a:ext cx="695738" cy="633047"/>
           </a:xfrm>
           <a:prstGeom prst="rect">
             <a:avLst/>
@@ -4225,10 +4260,10 @@
           <a:p>
             <a:pPr algn="ctr"/>
             <a:r>
-              <a:rPr lang="en-US" dirty="0" smtClean="0"/>
+              <a:rPr lang="en-US" sz="1000" dirty="0" smtClean="0"/>
               <a:t>Rename</a:t>
             </a:r>
-            <a:endParaRPr lang="en-US" dirty="0"/>
+            <a:endParaRPr lang="en-US" sz="1000" dirty="0"/>
           </a:p>
         </p:txBody>
       </p:sp>
@@ -4240,8 +4275,8 @@
         </p:nvSpPr>
         <p:spPr>
           <a:xfrm flipH="1">
-            <a:off x="2590800" y="2819400"/>
-            <a:ext cx="1905000" cy="1143000"/>
+            <a:off x="4267200" y="2667000"/>
+            <a:ext cx="1159564" cy="791308"/>
           </a:xfrm>
           <a:prstGeom prst="ellipse">
             <a:avLst/>
@@ -4270,14 +4305,14 @@
           <a:p>
             <a:pPr algn="ctr"/>
             <a:r>
-              <a:rPr lang="en-US" dirty="0" smtClean="0">
+              <a:rPr lang="en-US" sz="1000" dirty="0" smtClean="0">
                 <a:solidFill>
                   <a:schemeClr val="tx1"/>
                 </a:solidFill>
               </a:rPr>
               <a:t>Willamette metals data file</a:t>
             </a:r>
-            <a:endParaRPr lang="en-US" dirty="0">
+            <a:endParaRPr lang="en-US" sz="1000" dirty="0">
               <a:solidFill>
                 <a:schemeClr val="tx1"/>
               </a:solidFill>
@@ -4296,8 +4331,8 @@
         </p:nvCxnSpPr>
         <p:spPr>
           <a:xfrm>
-            <a:off x="3543300" y="2590800"/>
-            <a:ext cx="0" cy="228600"/>
+            <a:off x="4697897" y="2157047"/>
+            <a:ext cx="149085" cy="509953"/>
           </a:xfrm>
           <a:prstGeom prst="straightConnector1">
             <a:avLst/>
@@ -4331,9 +4366,9 @@
           <p:nvPr/>
         </p:nvCxnSpPr>
         <p:spPr>
-          <a:xfrm>
-            <a:off x="3543300" y="1447800"/>
-            <a:ext cx="0" cy="228600"/>
+          <a:xfrm flipH="1">
+            <a:off x="4697897" y="943708"/>
+            <a:ext cx="149085" cy="580292"/>
           </a:xfrm>
           <a:prstGeom prst="straightConnector1">
             <a:avLst/>
@@ -4365,8 +4400,8 @@
         </p:nvSpPr>
         <p:spPr>
           <a:xfrm>
-            <a:off x="685800" y="3200400"/>
-            <a:ext cx="1143000" cy="914400"/>
+            <a:off x="1524000" y="3581400"/>
+            <a:ext cx="695738" cy="633047"/>
           </a:xfrm>
           <a:prstGeom prst="rect">
             <a:avLst/>
@@ -4392,10 +4427,10 @@
           <a:p>
             <a:pPr algn="ctr"/>
             <a:r>
-              <a:rPr lang="en-US" dirty="0" smtClean="0"/>
+              <a:rPr lang="en-US" sz="1000" dirty="0" smtClean="0"/>
               <a:t>Combine</a:t>
             </a:r>
-            <a:endParaRPr lang="en-US" dirty="0"/>
+            <a:endParaRPr lang="en-US" sz="1000" dirty="0"/>
           </a:p>
         </p:txBody>
       </p:sp>
@@ -4404,14 +4439,14 @@
           <p:cNvPr id="51" name="Straight Arrow Connector 50"/>
           <p:cNvCxnSpPr>
             <a:stCxn id="5" idx="4"/>
-            <a:endCxn id="50" idx="0"/>
+            <a:endCxn id="76" idx="0"/>
           </p:cNvCxnSpPr>
           <p:nvPr/>
         </p:nvCxnSpPr>
         <p:spPr>
           <a:xfrm>
-            <a:off x="1257300" y="1524000"/>
-            <a:ext cx="0" cy="1676400"/>
+            <a:off x="998882" y="838200"/>
+            <a:ext cx="720587" cy="152400"/>
           </a:xfrm>
           <a:prstGeom prst="straightConnector1">
             <a:avLst/>
@@ -4439,51 +4474,15 @@
         <p:nvCxnSpPr>
           <p:cNvPr id="52" name="Straight Arrow Connector 51"/>
           <p:cNvCxnSpPr>
-            <a:stCxn id="43" idx="6"/>
+            <a:stCxn id="48" idx="6"/>
             <a:endCxn id="50" idx="3"/>
           </p:cNvCxnSpPr>
           <p:nvPr/>
         </p:nvCxnSpPr>
         <p:spPr>
           <a:xfrm flipH="1">
-            <a:off x="1828800" y="3390900"/>
-            <a:ext cx="762000" cy="266700"/>
-          </a:xfrm>
-          <a:prstGeom prst="straightConnector1">
-            <a:avLst/>
-          </a:prstGeom>
-          <a:ln>
-            <a:tailEnd type="arrow"/>
-          </a:ln>
-        </p:spPr>
-        <p:style>
-          <a:lnRef idx="1">
-            <a:schemeClr val="accent1"/>
-          </a:lnRef>
-          <a:fillRef idx="0">
-            <a:schemeClr val="accent1"/>
-          </a:fillRef>
-          <a:effectRef idx="0">
-            <a:schemeClr val="accent1"/>
-          </a:effectRef>
-          <a:fontRef idx="minor">
-            <a:schemeClr val="tx1"/>
-          </a:fontRef>
-        </p:style>
-      </p:cxnSp>
-      <p:cxnSp>
-        <p:nvCxnSpPr>
-          <p:cNvPr id="53" name="Straight Arrow Connector 52"/>
-          <p:cNvCxnSpPr>
-            <a:stCxn id="38" idx="6"/>
-            <a:endCxn id="50" idx="3"/>
-          </p:cNvCxnSpPr>
-          <p:nvPr/>
-        </p:nvCxnSpPr>
-        <p:spPr>
-          <a:xfrm flipH="1" flipV="1">
-            <a:off x="1828800" y="3657600"/>
-            <a:ext cx="2590800" cy="838200"/>
+            <a:off x="2219738" y="3569677"/>
+            <a:ext cx="447262" cy="328247"/>
           </a:xfrm>
           <a:prstGeom prst="straightConnector1">
             <a:avLst/>
@@ -4517,9 +4516,9 @@
           <p:nvPr/>
         </p:nvCxnSpPr>
         <p:spPr>
-          <a:xfrm>
-            <a:off x="1257300" y="4114800"/>
-            <a:ext cx="114300" cy="304800"/>
+          <a:xfrm flipH="1">
+            <a:off x="1729409" y="4214447"/>
+            <a:ext cx="142460" cy="205152"/>
           </a:xfrm>
           <a:prstGeom prst="straightConnector1">
             <a:avLst/>
@@ -4551,8 +4550,8 @@
         </p:nvSpPr>
         <p:spPr>
           <a:xfrm flipH="1">
-            <a:off x="457200" y="4419600"/>
-            <a:ext cx="1828800" cy="914400"/>
+            <a:off x="1172818" y="4419599"/>
+            <a:ext cx="1113182" cy="633047"/>
           </a:xfrm>
           <a:prstGeom prst="ellipse">
             <a:avLst/>
@@ -4581,14 +4580,14 @@
           <a:p>
             <a:pPr algn="ctr"/>
             <a:r>
-              <a:rPr lang="en-US" dirty="0" smtClean="0">
+              <a:rPr lang="en-US" sz="1000" dirty="0" smtClean="0">
                 <a:solidFill>
                   <a:schemeClr val="tx1"/>
                 </a:solidFill>
               </a:rPr>
               <a:t>Data</a:t>
             </a:r>
-            <a:endParaRPr lang="en-US" dirty="0">
+            <a:endParaRPr lang="en-US" sz="1000" dirty="0">
               <a:solidFill>
                 <a:schemeClr val="tx1"/>
               </a:solidFill>
@@ -4604,8 +4603,8 @@
         </p:nvSpPr>
         <p:spPr>
           <a:xfrm flipH="1">
-            <a:off x="7239000" y="5334000"/>
-            <a:ext cx="1524000" cy="914400"/>
+            <a:off x="7835347" y="5333999"/>
+            <a:ext cx="927651" cy="633047"/>
           </a:xfrm>
           <a:prstGeom prst="ellipse">
             <a:avLst/>
@@ -4634,14 +4633,14 @@
           <a:p>
             <a:pPr algn="ctr"/>
             <a:r>
-              <a:rPr lang="en-US" dirty="0" smtClean="0">
+              <a:rPr lang="en-US" sz="1000" dirty="0" smtClean="0">
                 <a:solidFill>
                   <a:schemeClr val="tx1"/>
                 </a:solidFill>
               </a:rPr>
               <a:t>Data without Void</a:t>
             </a:r>
-            <a:endParaRPr lang="en-US" dirty="0">
+            <a:endParaRPr lang="en-US" sz="1000" dirty="0">
               <a:solidFill>
                 <a:schemeClr val="tx1"/>
               </a:solidFill>
@@ -4657,8 +4656,8 @@
         </p:nvSpPr>
         <p:spPr>
           <a:xfrm>
-            <a:off x="5867400" y="5105400"/>
-            <a:ext cx="1143000" cy="1447800"/>
+            <a:off x="6314661" y="5105399"/>
+            <a:ext cx="695738" cy="1002323"/>
           </a:xfrm>
           <a:prstGeom prst="rect">
             <a:avLst/>
@@ -4684,10 +4683,10 @@
           <a:p>
             <a:pPr algn="ctr"/>
             <a:r>
-              <a:rPr lang="en-US" dirty="0" smtClean="0"/>
+              <a:rPr lang="en-US" sz="1000" dirty="0" smtClean="0"/>
               <a:t>Select A &amp; B DQL only &amp; Remove VOID</a:t>
             </a:r>
-            <a:endParaRPr lang="en-US" dirty="0"/>
+            <a:endParaRPr lang="en-US" sz="1000" dirty="0"/>
           </a:p>
         </p:txBody>
       </p:sp>
@@ -4701,9 +4700,9 @@
           <p:nvPr/>
         </p:nvCxnSpPr>
         <p:spPr>
-          <a:xfrm flipV="1">
-            <a:off x="7010400" y="5791200"/>
-            <a:ext cx="228600" cy="38100"/>
+          <a:xfrm>
+            <a:off x="7010399" y="5606561"/>
+            <a:ext cx="824948" cy="43962"/>
           </a:xfrm>
           <a:prstGeom prst="straightConnector1">
             <a:avLst/>
@@ -4735,8 +4734,8 @@
         </p:nvSpPr>
         <p:spPr>
           <a:xfrm>
-            <a:off x="2438400" y="5181600"/>
-            <a:ext cx="1143000" cy="914400"/>
+            <a:off x="2885661" y="5181599"/>
+            <a:ext cx="695738" cy="633047"/>
           </a:xfrm>
           <a:prstGeom prst="rect">
             <a:avLst/>
@@ -4762,10 +4761,10 @@
           <a:p>
             <a:pPr algn="ctr"/>
             <a:r>
-              <a:rPr lang="en-US" dirty="0" smtClean="0"/>
+              <a:rPr lang="en-US" sz="1000" dirty="0" smtClean="0"/>
               <a:t>Combine</a:t>
             </a:r>
-            <a:endParaRPr lang="en-US" dirty="0"/>
+            <a:endParaRPr lang="en-US" sz="1000" dirty="0"/>
           </a:p>
         </p:txBody>
       </p:sp>
@@ -4780,8 +4779,8 @@
         </p:nvCxnSpPr>
         <p:spPr>
           <a:xfrm flipV="1">
-            <a:off x="2209800" y="5638800"/>
-            <a:ext cx="228600" cy="342900"/>
+            <a:off x="2209799" y="5498123"/>
+            <a:ext cx="675862" cy="331177"/>
           </a:xfrm>
           <a:prstGeom prst="straightConnector1">
             <a:avLst/>
@@ -4813,8 +4812,8 @@
         </p:nvSpPr>
         <p:spPr>
           <a:xfrm flipH="1">
-            <a:off x="3810000" y="5181600"/>
-            <a:ext cx="1828800" cy="914400"/>
+            <a:off x="4525618" y="5181599"/>
+            <a:ext cx="1113182" cy="633047"/>
           </a:xfrm>
           <a:prstGeom prst="ellipse">
             <a:avLst/>
@@ -4843,14 +4842,14 @@
           <a:p>
             <a:pPr algn="ctr"/>
             <a:r>
-              <a:rPr lang="en-US" dirty="0" smtClean="0">
+              <a:rPr lang="en-US" sz="1000" dirty="0" smtClean="0">
                 <a:solidFill>
                   <a:schemeClr val="tx1"/>
                 </a:solidFill>
               </a:rPr>
               <a:t>Data with Category</a:t>
             </a:r>
-            <a:endParaRPr lang="en-US" dirty="0">
+            <a:endParaRPr lang="en-US" sz="1000" dirty="0">
               <a:solidFill>
                 <a:schemeClr val="tx1"/>
               </a:solidFill>
@@ -4869,8 +4868,8 @@
         </p:nvCxnSpPr>
         <p:spPr>
           <a:xfrm>
-            <a:off x="3581400" y="5638800"/>
-            <a:ext cx="228600" cy="0"/>
+            <a:off x="3581399" y="5498123"/>
+            <a:ext cx="944219" cy="0"/>
           </a:xfrm>
           <a:prstGeom prst="straightConnector1">
             <a:avLst/>
@@ -4905,8 +4904,8 @@
         </p:nvCxnSpPr>
         <p:spPr>
           <a:xfrm>
-            <a:off x="5638800" y="5638800"/>
-            <a:ext cx="228600" cy="190500"/>
+            <a:off x="5638800" y="5498123"/>
+            <a:ext cx="675861" cy="108438"/>
           </a:xfrm>
           <a:prstGeom prst="straightConnector1">
             <a:avLst/>
@@ -4941,8 +4940,8 @@
         </p:nvCxnSpPr>
         <p:spPr>
           <a:xfrm>
-            <a:off x="2018178" y="5200089"/>
-            <a:ext cx="420222" cy="438711"/>
+            <a:off x="2122978" y="4959938"/>
+            <a:ext cx="762683" cy="538185"/>
           </a:xfrm>
           <a:prstGeom prst="straightConnector1">
             <a:avLst/>
@@ -4976,9 +4975,9 @@
           <p:nvPr/>
         </p:nvCxnSpPr>
         <p:spPr>
-          <a:xfrm>
-            <a:off x="4724400" y="6096000"/>
-            <a:ext cx="43702" cy="392668"/>
+          <a:xfrm flipH="1">
+            <a:off x="4451477" y="5814646"/>
+            <a:ext cx="630732" cy="674022"/>
           </a:xfrm>
           <a:prstGeom prst="straightConnector1">
             <a:avLst/>
@@ -5011,7 +5010,7 @@
         <p:spPr>
           <a:xfrm>
             <a:off x="3962400" y="6488668"/>
-            <a:ext cx="1611403" cy="369332"/>
+            <a:ext cx="978153" cy="246221"/>
           </a:xfrm>
           <a:prstGeom prst="rect">
             <a:avLst/>
@@ -5025,21 +5024,909 @@
           <a:lstStyle/>
           <a:p>
             <a:r>
-              <a:rPr lang="en-US" dirty="0" smtClean="0"/>
+              <a:rPr lang="en-US" sz="1000" dirty="0" smtClean="0"/>
               <a:t>Save as .</a:t>
             </a:r>
             <a:r>
-              <a:rPr lang="en-US" dirty="0" err="1" smtClean="0"/>
+              <a:rPr lang="en-US" sz="1000" dirty="0" err="1" smtClean="0"/>
               <a:t>csv</a:t>
             </a:r>
             <a:r>
-              <a:rPr lang="en-US" dirty="0" smtClean="0"/>
+              <a:rPr lang="en-US" sz="1000" dirty="0" smtClean="0"/>
               <a:t> file</a:t>
             </a:r>
-            <a:endParaRPr lang="en-US" dirty="0"/>
-          </a:p>
-        </p:txBody>
-      </p:sp>
+            <a:endParaRPr lang="en-US" sz="1000" dirty="0"/>
+          </a:p>
+        </p:txBody>
+      </p:sp>
+      <p:sp>
+        <p:nvSpPr>
+          <p:cNvPr id="48" name="Oval 47"/>
+          <p:cNvSpPr/>
+          <p:nvPr/>
+        </p:nvSpPr>
+        <p:spPr>
+          <a:xfrm flipH="1">
+            <a:off x="2667000" y="3200400"/>
+            <a:ext cx="1113184" cy="738554"/>
+          </a:xfrm>
+          <a:prstGeom prst="ellipse">
+            <a:avLst/>
+          </a:prstGeom>
+          <a:noFill/>
+        </p:spPr>
+        <p:style>
+          <a:lnRef idx="2">
+            <a:schemeClr val="accent1">
+              <a:shade val="50000"/>
+            </a:schemeClr>
+          </a:lnRef>
+          <a:fillRef idx="1">
+            <a:schemeClr val="accent1"/>
+          </a:fillRef>
+          <a:effectRef idx="0">
+            <a:schemeClr val="accent1"/>
+          </a:effectRef>
+          <a:fontRef idx="minor">
+            <a:schemeClr val="lt1"/>
+          </a:fontRef>
+        </p:style>
+        <p:txBody>
+          <a:bodyPr rtlCol="0" anchor="ctr"/>
+          <a:lstStyle/>
+          <a:p>
+            <a:pPr algn="ctr"/>
+            <a:r>
+              <a:rPr lang="en-US" sz="1000" dirty="0" smtClean="0">
+                <a:solidFill>
+                  <a:schemeClr val="tx1"/>
+                </a:solidFill>
+              </a:rPr>
+              <a:t>LASAR data (w Element names)</a:t>
+            </a:r>
+            <a:endParaRPr lang="en-US" sz="1000" dirty="0">
+              <a:solidFill>
+                <a:schemeClr val="tx1"/>
+              </a:solidFill>
+            </a:endParaRPr>
+          </a:p>
+        </p:txBody>
+      </p:sp>
+      <p:cxnSp>
+        <p:nvCxnSpPr>
+          <p:cNvPr id="54" name="Straight Arrow Connector 53"/>
+          <p:cNvCxnSpPr>
+            <a:stCxn id="38" idx="6"/>
+            <a:endCxn id="60" idx="3"/>
+          </p:cNvCxnSpPr>
+          <p:nvPr/>
+        </p:nvCxnSpPr>
+        <p:spPr>
+          <a:xfrm flipH="1" flipV="1">
+            <a:off x="4810538" y="3897924"/>
+            <a:ext cx="371062" cy="52753"/>
+          </a:xfrm>
+          <a:prstGeom prst="straightConnector1">
+            <a:avLst/>
+          </a:prstGeom>
+          <a:ln>
+            <a:tailEnd type="arrow"/>
+          </a:ln>
+        </p:spPr>
+        <p:style>
+          <a:lnRef idx="1">
+            <a:schemeClr val="accent1"/>
+          </a:lnRef>
+          <a:fillRef idx="0">
+            <a:schemeClr val="accent1"/>
+          </a:fillRef>
+          <a:effectRef idx="0">
+            <a:schemeClr val="accent1"/>
+          </a:effectRef>
+          <a:fontRef idx="minor">
+            <a:schemeClr val="tx1"/>
+          </a:fontRef>
+        </p:style>
+      </p:cxnSp>
+      <p:sp>
+        <p:nvSpPr>
+          <p:cNvPr id="60" name="Rectangle 59"/>
+          <p:cNvSpPr/>
+          <p:nvPr/>
+        </p:nvSpPr>
+        <p:spPr>
+          <a:xfrm>
+            <a:off x="4114800" y="3581400"/>
+            <a:ext cx="695738" cy="633047"/>
+          </a:xfrm>
+          <a:prstGeom prst="rect">
+            <a:avLst/>
+          </a:prstGeom>
+        </p:spPr>
+        <p:style>
+          <a:lnRef idx="2">
+            <a:schemeClr val="accent6"/>
+          </a:lnRef>
+          <a:fillRef idx="1">
+            <a:schemeClr val="lt1"/>
+          </a:fillRef>
+          <a:effectRef idx="0">
+            <a:schemeClr val="accent6"/>
+          </a:effectRef>
+          <a:fontRef idx="minor">
+            <a:schemeClr val="dk1"/>
+          </a:fontRef>
+        </p:style>
+        <p:txBody>
+          <a:bodyPr rtlCol="0" anchor="ctr"/>
+          <a:lstStyle/>
+          <a:p>
+            <a:pPr algn="ctr"/>
+            <a:r>
+              <a:rPr lang="en-US" sz="1000" dirty="0" smtClean="0"/>
+              <a:t>Combine</a:t>
+            </a:r>
+            <a:endParaRPr lang="en-US" sz="1000" dirty="0"/>
+          </a:p>
+        </p:txBody>
+      </p:sp>
+      <p:cxnSp>
+        <p:nvCxnSpPr>
+          <p:cNvPr id="63" name="Straight Arrow Connector 62"/>
+          <p:cNvCxnSpPr>
+            <a:stCxn id="43" idx="4"/>
+            <a:endCxn id="60" idx="0"/>
+          </p:cNvCxnSpPr>
+          <p:nvPr/>
+        </p:nvCxnSpPr>
+        <p:spPr>
+          <a:xfrm flipH="1">
+            <a:off x="4462669" y="3458308"/>
+            <a:ext cx="384313" cy="123092"/>
+          </a:xfrm>
+          <a:prstGeom prst="straightConnector1">
+            <a:avLst/>
+          </a:prstGeom>
+          <a:ln>
+            <a:tailEnd type="arrow"/>
+          </a:ln>
+        </p:spPr>
+        <p:style>
+          <a:lnRef idx="1">
+            <a:schemeClr val="accent1"/>
+          </a:lnRef>
+          <a:fillRef idx="0">
+            <a:schemeClr val="accent1"/>
+          </a:fillRef>
+          <a:effectRef idx="0">
+            <a:schemeClr val="accent1"/>
+          </a:effectRef>
+          <a:fontRef idx="minor">
+            <a:schemeClr val="tx1"/>
+          </a:fontRef>
+        </p:style>
+      </p:cxnSp>
+      <p:cxnSp>
+        <p:nvCxnSpPr>
+          <p:cNvPr id="66" name="Straight Arrow Connector 65"/>
+          <p:cNvCxnSpPr>
+            <a:stCxn id="60" idx="1"/>
+            <a:endCxn id="48" idx="2"/>
+          </p:cNvCxnSpPr>
+          <p:nvPr/>
+        </p:nvCxnSpPr>
+        <p:spPr>
+          <a:xfrm flipH="1" flipV="1">
+            <a:off x="3780184" y="3569677"/>
+            <a:ext cx="334616" cy="328247"/>
+          </a:xfrm>
+          <a:prstGeom prst="straightConnector1">
+            <a:avLst/>
+          </a:prstGeom>
+          <a:ln>
+            <a:tailEnd type="arrow"/>
+          </a:ln>
+        </p:spPr>
+        <p:style>
+          <a:lnRef idx="1">
+            <a:schemeClr val="accent1"/>
+          </a:lnRef>
+          <a:fillRef idx="0">
+            <a:schemeClr val="accent1"/>
+          </a:fillRef>
+          <a:effectRef idx="0">
+            <a:schemeClr val="accent1"/>
+          </a:effectRef>
+          <a:fontRef idx="minor">
+            <a:schemeClr val="tx1"/>
+          </a:fontRef>
+        </p:style>
+      </p:cxnSp>
+      <p:sp>
+        <p:nvSpPr>
+          <p:cNvPr id="67" name="Rectangle 66"/>
+          <p:cNvSpPr/>
+          <p:nvPr/>
+        </p:nvSpPr>
+        <p:spPr>
+          <a:xfrm>
+            <a:off x="3962400" y="76200"/>
+            <a:ext cx="5029200" cy="4495800"/>
+          </a:xfrm>
+          <a:prstGeom prst="rect">
+            <a:avLst/>
+          </a:prstGeom>
+          <a:solidFill>
+            <a:schemeClr val="bg1">
+              <a:lumMod val="75000"/>
+              <a:alpha val="39000"/>
+            </a:schemeClr>
+          </a:solidFill>
+          <a:ln cap="rnd" cmpd="dbl">
+            <a:solidFill>
+              <a:srgbClr val="C00000"/>
+            </a:solidFill>
+            <a:prstDash val="sysDash"/>
+            <a:round/>
+          </a:ln>
+        </p:spPr>
+        <p:style>
+          <a:lnRef idx="2">
+            <a:schemeClr val="accent1">
+              <a:shade val="50000"/>
+            </a:schemeClr>
+          </a:lnRef>
+          <a:fillRef idx="1">
+            <a:schemeClr val="accent1"/>
+          </a:fillRef>
+          <a:effectRef idx="0">
+            <a:schemeClr val="accent1"/>
+          </a:effectRef>
+          <a:fontRef idx="minor">
+            <a:schemeClr val="lt1"/>
+          </a:fontRef>
+        </p:style>
+        <p:txBody>
+          <a:bodyPr rtlCol="0" anchor="ctr"/>
+          <a:lstStyle/>
+          <a:p>
+            <a:pPr algn="ctr"/>
+            <a:endParaRPr lang="en-US"/>
+          </a:p>
+        </p:txBody>
+      </p:sp>
+      <p:sp>
+        <p:nvSpPr>
+          <p:cNvPr id="68" name="TextBox 67"/>
+          <p:cNvSpPr txBox="1"/>
+          <p:nvPr/>
+        </p:nvSpPr>
+        <p:spPr>
+          <a:xfrm>
+            <a:off x="5562600" y="152400"/>
+            <a:ext cx="3272050" cy="400110"/>
+          </a:xfrm>
+          <a:prstGeom prst="rect">
+            <a:avLst/>
+          </a:prstGeom>
+          <a:noFill/>
+        </p:spPr>
+        <p:txBody>
+          <a:bodyPr wrap="none" rtlCol="0">
+            <a:spAutoFit/>
+          </a:bodyPr>
+          <a:lstStyle/>
+          <a:p>
+            <a:r>
+              <a:rPr lang="en-US" sz="1000" dirty="0" smtClean="0">
+                <a:solidFill>
+                  <a:srgbClr val="FF0000"/>
+                </a:solidFill>
+              </a:rPr>
+              <a:t>This section has been done and was output to a single .</a:t>
+            </a:r>
+            <a:r>
+              <a:rPr lang="en-US" sz="1000" dirty="0" err="1" smtClean="0">
+                <a:solidFill>
+                  <a:srgbClr val="FF0000"/>
+                </a:solidFill>
+              </a:rPr>
+              <a:t>csv</a:t>
+            </a:r>
+            <a:r>
+              <a:rPr lang="en-US" sz="1000" dirty="0" smtClean="0">
+                <a:solidFill>
+                  <a:srgbClr val="FF0000"/>
+                </a:solidFill>
+              </a:rPr>
+              <a:t>. </a:t>
+            </a:r>
+          </a:p>
+          <a:p>
+            <a:r>
+              <a:rPr lang="en-US" sz="1000" dirty="0" smtClean="0">
+                <a:solidFill>
+                  <a:srgbClr val="FF0000"/>
+                </a:solidFill>
+              </a:rPr>
+              <a:t>That .</a:t>
+            </a:r>
+            <a:r>
+              <a:rPr lang="en-US" sz="1000" dirty="0" err="1" smtClean="0">
+                <a:solidFill>
+                  <a:srgbClr val="FF0000"/>
+                </a:solidFill>
+              </a:rPr>
+              <a:t>csv</a:t>
+            </a:r>
+            <a:r>
+              <a:rPr lang="en-US" sz="1000" dirty="0" smtClean="0">
+                <a:solidFill>
+                  <a:srgbClr val="FF0000"/>
+                </a:solidFill>
+              </a:rPr>
+              <a:t> is imported as </a:t>
+            </a:r>
+            <a:r>
+              <a:rPr lang="en-US" sz="1000" dirty="0" err="1" smtClean="0">
+                <a:solidFill>
+                  <a:srgbClr val="FF0000"/>
+                </a:solidFill>
+              </a:rPr>
+              <a:t>lasar</a:t>
+            </a:r>
+            <a:r>
+              <a:rPr lang="en-US" sz="1000" dirty="0" smtClean="0">
+                <a:solidFill>
+                  <a:srgbClr val="FF0000"/>
+                </a:solidFill>
+              </a:rPr>
+              <a:t>.</a:t>
+            </a:r>
+            <a:endParaRPr lang="en-US" sz="1000" dirty="0">
+              <a:solidFill>
+                <a:srgbClr val="FF0000"/>
+              </a:solidFill>
+            </a:endParaRPr>
+          </a:p>
+        </p:txBody>
+      </p:sp>
+      <p:sp>
+        <p:nvSpPr>
+          <p:cNvPr id="73" name="Oval 72"/>
+          <p:cNvSpPr/>
+          <p:nvPr/>
+        </p:nvSpPr>
+        <p:spPr>
+          <a:xfrm flipH="1">
+            <a:off x="2133600" y="152400"/>
+            <a:ext cx="1388164" cy="762000"/>
+          </a:xfrm>
+          <a:prstGeom prst="ellipse">
+            <a:avLst/>
+          </a:prstGeom>
+          <a:noFill/>
+        </p:spPr>
+        <p:style>
+          <a:lnRef idx="2">
+            <a:schemeClr val="accent1">
+              <a:shade val="50000"/>
+            </a:schemeClr>
+          </a:lnRef>
+          <a:fillRef idx="1">
+            <a:schemeClr val="accent1"/>
+          </a:fillRef>
+          <a:effectRef idx="0">
+            <a:schemeClr val="accent1"/>
+          </a:effectRef>
+          <a:fontRef idx="minor">
+            <a:schemeClr val="lt1"/>
+          </a:fontRef>
+        </p:style>
+        <p:txBody>
+          <a:bodyPr rtlCol="0" anchor="ctr"/>
+          <a:lstStyle/>
+          <a:p>
+            <a:pPr algn="ctr"/>
+            <a:r>
+              <a:rPr lang="en-US" sz="1000" dirty="0" smtClean="0">
+                <a:solidFill>
+                  <a:schemeClr val="tx1"/>
+                </a:solidFill>
+              </a:rPr>
+              <a:t>Element </a:t>
+            </a:r>
+            <a:r>
+              <a:rPr lang="en-US" sz="1000" dirty="0" smtClean="0">
+                <a:solidFill>
+                  <a:schemeClr val="tx1"/>
+                </a:solidFill>
+              </a:rPr>
+              <a:t>Data Qualifiers (from file)</a:t>
+            </a:r>
+            <a:endParaRPr lang="en-US" sz="1000" dirty="0">
+              <a:solidFill>
+                <a:schemeClr val="tx1"/>
+              </a:solidFill>
+            </a:endParaRPr>
+          </a:p>
+        </p:txBody>
+      </p:sp>
+      <p:sp>
+        <p:nvSpPr>
+          <p:cNvPr id="76" name="Rectangle 75"/>
+          <p:cNvSpPr/>
+          <p:nvPr/>
+        </p:nvSpPr>
+        <p:spPr>
+          <a:xfrm>
+            <a:off x="1371600" y="990600"/>
+            <a:ext cx="695738" cy="633047"/>
+          </a:xfrm>
+          <a:prstGeom prst="rect">
+            <a:avLst/>
+          </a:prstGeom>
+        </p:spPr>
+        <p:style>
+          <a:lnRef idx="2">
+            <a:schemeClr val="accent6"/>
+          </a:lnRef>
+          <a:fillRef idx="1">
+            <a:schemeClr val="lt1"/>
+          </a:fillRef>
+          <a:effectRef idx="0">
+            <a:schemeClr val="accent6"/>
+          </a:effectRef>
+          <a:fontRef idx="minor">
+            <a:schemeClr val="dk1"/>
+          </a:fontRef>
+        </p:style>
+        <p:txBody>
+          <a:bodyPr rtlCol="0" anchor="ctr"/>
+          <a:lstStyle/>
+          <a:p>
+            <a:pPr algn="ctr"/>
+            <a:r>
+              <a:rPr lang="en-US" sz="1000" dirty="0" smtClean="0"/>
+              <a:t>Combine</a:t>
+            </a:r>
+            <a:endParaRPr lang="en-US" sz="1000" dirty="0"/>
+          </a:p>
+        </p:txBody>
+      </p:sp>
+      <p:cxnSp>
+        <p:nvCxnSpPr>
+          <p:cNvPr id="78" name="Straight Arrow Connector 77"/>
+          <p:cNvCxnSpPr>
+            <a:stCxn id="73" idx="5"/>
+            <a:endCxn id="76" idx="0"/>
+          </p:cNvCxnSpPr>
+          <p:nvPr/>
+        </p:nvCxnSpPr>
+        <p:spPr>
+          <a:xfrm flipH="1">
+            <a:off x="1719469" y="802808"/>
+            <a:ext cx="617423" cy="187792"/>
+          </a:xfrm>
+          <a:prstGeom prst="straightConnector1">
+            <a:avLst/>
+          </a:prstGeom>
+          <a:ln>
+            <a:tailEnd type="arrow"/>
+          </a:ln>
+        </p:spPr>
+        <p:style>
+          <a:lnRef idx="1">
+            <a:schemeClr val="accent1"/>
+          </a:lnRef>
+          <a:fillRef idx="0">
+            <a:schemeClr val="accent1"/>
+          </a:fillRef>
+          <a:effectRef idx="0">
+            <a:schemeClr val="accent1"/>
+          </a:effectRef>
+          <a:fontRef idx="minor">
+            <a:schemeClr val="tx1"/>
+          </a:fontRef>
+        </p:style>
+      </p:cxnSp>
+      <p:cxnSp>
+        <p:nvCxnSpPr>
+          <p:cNvPr id="90" name="Straight Arrow Connector 89"/>
+          <p:cNvCxnSpPr>
+            <a:stCxn id="76" idx="2"/>
+            <a:endCxn id="93" idx="0"/>
+          </p:cNvCxnSpPr>
+          <p:nvPr/>
+        </p:nvCxnSpPr>
+        <p:spPr>
+          <a:xfrm flipH="1">
+            <a:off x="1028700" y="1623647"/>
+            <a:ext cx="690769" cy="128953"/>
+          </a:xfrm>
+          <a:prstGeom prst="straightConnector1">
+            <a:avLst/>
+          </a:prstGeom>
+          <a:ln>
+            <a:tailEnd type="arrow"/>
+          </a:ln>
+        </p:spPr>
+        <p:style>
+          <a:lnRef idx="1">
+            <a:schemeClr val="accent1"/>
+          </a:lnRef>
+          <a:fillRef idx="0">
+            <a:schemeClr val="accent1"/>
+          </a:fillRef>
+          <a:effectRef idx="0">
+            <a:schemeClr val="accent1"/>
+          </a:effectRef>
+          <a:fontRef idx="minor">
+            <a:schemeClr val="tx1"/>
+          </a:fontRef>
+        </p:style>
+      </p:cxnSp>
+      <p:sp>
+        <p:nvSpPr>
+          <p:cNvPr id="93" name="Oval 92"/>
+          <p:cNvSpPr/>
+          <p:nvPr/>
+        </p:nvSpPr>
+        <p:spPr>
+          <a:xfrm flipH="1">
+            <a:off x="228600" y="1752600"/>
+            <a:ext cx="1600200" cy="533400"/>
+          </a:xfrm>
+          <a:prstGeom prst="ellipse">
+            <a:avLst/>
+          </a:prstGeom>
+          <a:noFill/>
+        </p:spPr>
+        <p:style>
+          <a:lnRef idx="2">
+            <a:schemeClr val="accent1">
+              <a:shade val="50000"/>
+            </a:schemeClr>
+          </a:lnRef>
+          <a:fillRef idx="1">
+            <a:schemeClr val="accent1"/>
+          </a:fillRef>
+          <a:effectRef idx="0">
+            <a:schemeClr val="accent1"/>
+          </a:effectRef>
+          <a:fontRef idx="minor">
+            <a:schemeClr val="lt1"/>
+          </a:fontRef>
+        </p:style>
+        <p:txBody>
+          <a:bodyPr rtlCol="0" anchor="ctr"/>
+          <a:lstStyle/>
+          <a:p>
+            <a:pPr algn="ctr"/>
+            <a:r>
+              <a:rPr lang="en-US" sz="1000" dirty="0" smtClean="0">
+                <a:solidFill>
+                  <a:schemeClr val="tx1"/>
+                </a:solidFill>
+              </a:rPr>
+              <a:t>Element </a:t>
+            </a:r>
+            <a:r>
+              <a:rPr lang="en-US" sz="1000" dirty="0" smtClean="0">
+                <a:solidFill>
+                  <a:schemeClr val="tx1"/>
+                </a:solidFill>
+              </a:rPr>
+              <a:t>Data</a:t>
+            </a:r>
+            <a:endParaRPr lang="en-US" sz="1000" dirty="0">
+              <a:solidFill>
+                <a:schemeClr val="tx1"/>
+              </a:solidFill>
+            </a:endParaRPr>
+          </a:p>
+        </p:txBody>
+      </p:sp>
+      <p:sp>
+        <p:nvSpPr>
+          <p:cNvPr id="105" name="Oval 104"/>
+          <p:cNvSpPr/>
+          <p:nvPr/>
+        </p:nvSpPr>
+        <p:spPr>
+          <a:xfrm flipH="1">
+            <a:off x="2133600" y="1447800"/>
+            <a:ext cx="1676400" cy="762000"/>
+          </a:xfrm>
+          <a:prstGeom prst="ellipse">
+            <a:avLst/>
+          </a:prstGeom>
+          <a:noFill/>
+        </p:spPr>
+        <p:style>
+          <a:lnRef idx="2">
+            <a:schemeClr val="accent1">
+              <a:shade val="50000"/>
+            </a:schemeClr>
+          </a:lnRef>
+          <a:fillRef idx="1">
+            <a:schemeClr val="accent1"/>
+          </a:fillRef>
+          <a:effectRef idx="0">
+            <a:schemeClr val="accent1"/>
+          </a:effectRef>
+          <a:fontRef idx="minor">
+            <a:schemeClr val="lt1"/>
+          </a:fontRef>
+        </p:style>
+        <p:txBody>
+          <a:bodyPr rtlCol="0" anchor="ctr"/>
+          <a:lstStyle/>
+          <a:p>
+            <a:pPr algn="ctr"/>
+            <a:r>
+              <a:rPr lang="en-US" sz="1000" dirty="0" smtClean="0">
+                <a:solidFill>
+                  <a:schemeClr val="tx1"/>
+                </a:solidFill>
+              </a:rPr>
+              <a:t>Element Station Matrices (from file)</a:t>
+            </a:r>
+            <a:endParaRPr lang="en-US" sz="1000" dirty="0">
+              <a:solidFill>
+                <a:schemeClr val="tx1"/>
+              </a:solidFill>
+            </a:endParaRPr>
+          </a:p>
+        </p:txBody>
+      </p:sp>
+      <p:sp>
+        <p:nvSpPr>
+          <p:cNvPr id="106" name="Rectangle 105"/>
+          <p:cNvSpPr/>
+          <p:nvPr/>
+        </p:nvSpPr>
+        <p:spPr>
+          <a:xfrm>
+            <a:off x="1600200" y="2438400"/>
+            <a:ext cx="762000" cy="457200"/>
+          </a:xfrm>
+          <a:prstGeom prst="rect">
+            <a:avLst/>
+          </a:prstGeom>
+        </p:spPr>
+        <p:style>
+          <a:lnRef idx="2">
+            <a:schemeClr val="accent6"/>
+          </a:lnRef>
+          <a:fillRef idx="1">
+            <a:schemeClr val="lt1"/>
+          </a:fillRef>
+          <a:effectRef idx="0">
+            <a:schemeClr val="accent6"/>
+          </a:effectRef>
+          <a:fontRef idx="minor">
+            <a:schemeClr val="dk1"/>
+          </a:fontRef>
+        </p:style>
+        <p:txBody>
+          <a:bodyPr rtlCol="0" anchor="ctr"/>
+          <a:lstStyle/>
+          <a:p>
+            <a:pPr algn="ctr"/>
+            <a:r>
+              <a:rPr lang="en-US" sz="1000" dirty="0" smtClean="0"/>
+              <a:t>Combine</a:t>
+            </a:r>
+            <a:endParaRPr lang="en-US" sz="1000" dirty="0"/>
+          </a:p>
+        </p:txBody>
+      </p:sp>
+      <p:cxnSp>
+        <p:nvCxnSpPr>
+          <p:cNvPr id="108" name="Straight Arrow Connector 107"/>
+          <p:cNvCxnSpPr>
+            <a:stCxn id="105" idx="5"/>
+            <a:endCxn id="106" idx="0"/>
+          </p:cNvCxnSpPr>
+          <p:nvPr/>
+        </p:nvCxnSpPr>
+        <p:spPr>
+          <a:xfrm flipH="1">
+            <a:off x="1981200" y="2098208"/>
+            <a:ext cx="397903" cy="340192"/>
+          </a:xfrm>
+          <a:prstGeom prst="straightConnector1">
+            <a:avLst/>
+          </a:prstGeom>
+          <a:ln>
+            <a:tailEnd type="arrow"/>
+          </a:ln>
+        </p:spPr>
+        <p:style>
+          <a:lnRef idx="1">
+            <a:schemeClr val="accent1"/>
+          </a:lnRef>
+          <a:fillRef idx="0">
+            <a:schemeClr val="accent1"/>
+          </a:fillRef>
+          <a:effectRef idx="0">
+            <a:schemeClr val="accent1"/>
+          </a:effectRef>
+          <a:fontRef idx="minor">
+            <a:schemeClr val="tx1"/>
+          </a:fontRef>
+        </p:style>
+      </p:cxnSp>
+      <p:cxnSp>
+        <p:nvCxnSpPr>
+          <p:cNvPr id="110" name="Straight Arrow Connector 109"/>
+          <p:cNvCxnSpPr>
+            <a:stCxn id="93" idx="3"/>
+            <a:endCxn id="106" idx="0"/>
+          </p:cNvCxnSpPr>
+          <p:nvPr/>
+        </p:nvCxnSpPr>
+        <p:spPr>
+          <a:xfrm>
+            <a:off x="1594456" y="2207885"/>
+            <a:ext cx="386744" cy="230515"/>
+          </a:xfrm>
+          <a:prstGeom prst="straightConnector1">
+            <a:avLst/>
+          </a:prstGeom>
+          <a:ln>
+            <a:tailEnd type="arrow"/>
+          </a:ln>
+        </p:spPr>
+        <p:style>
+          <a:lnRef idx="1">
+            <a:schemeClr val="accent1"/>
+          </a:lnRef>
+          <a:fillRef idx="0">
+            <a:schemeClr val="accent1"/>
+          </a:fillRef>
+          <a:effectRef idx="0">
+            <a:schemeClr val="accent1"/>
+          </a:effectRef>
+          <a:fontRef idx="minor">
+            <a:schemeClr val="tx1"/>
+          </a:fontRef>
+        </p:style>
+      </p:cxnSp>
+      <p:sp>
+        <p:nvSpPr>
+          <p:cNvPr id="111" name="Oval 110"/>
+          <p:cNvSpPr/>
+          <p:nvPr/>
+        </p:nvSpPr>
+        <p:spPr>
+          <a:xfrm flipH="1">
+            <a:off x="152400" y="2971800"/>
+            <a:ext cx="1600200" cy="533400"/>
+          </a:xfrm>
+          <a:prstGeom prst="ellipse">
+            <a:avLst/>
+          </a:prstGeom>
+          <a:noFill/>
+        </p:spPr>
+        <p:style>
+          <a:lnRef idx="2">
+            <a:schemeClr val="accent1">
+              <a:shade val="50000"/>
+            </a:schemeClr>
+          </a:lnRef>
+          <a:fillRef idx="1">
+            <a:schemeClr val="accent1"/>
+          </a:fillRef>
+          <a:effectRef idx="0">
+            <a:schemeClr val="accent1"/>
+          </a:effectRef>
+          <a:fontRef idx="minor">
+            <a:schemeClr val="lt1"/>
+          </a:fontRef>
+        </p:style>
+        <p:txBody>
+          <a:bodyPr rtlCol="0" anchor="ctr"/>
+          <a:lstStyle/>
+          <a:p>
+            <a:pPr algn="ctr"/>
+            <a:r>
+              <a:rPr lang="en-US" sz="1000" dirty="0" smtClean="0">
+                <a:solidFill>
+                  <a:schemeClr val="tx1"/>
+                </a:solidFill>
+              </a:rPr>
+              <a:t>Element </a:t>
+            </a:r>
+            <a:r>
+              <a:rPr lang="en-US" sz="1000" dirty="0" smtClean="0">
+                <a:solidFill>
+                  <a:schemeClr val="tx1"/>
+                </a:solidFill>
+              </a:rPr>
+              <a:t>Data</a:t>
+            </a:r>
+            <a:endParaRPr lang="en-US" sz="1000" dirty="0">
+              <a:solidFill>
+                <a:schemeClr val="tx1"/>
+              </a:solidFill>
+            </a:endParaRPr>
+          </a:p>
+        </p:txBody>
+      </p:sp>
+      <p:cxnSp>
+        <p:nvCxnSpPr>
+          <p:cNvPr id="113" name="Straight Arrow Connector 112"/>
+          <p:cNvCxnSpPr>
+            <a:stCxn id="106" idx="1"/>
+            <a:endCxn id="111" idx="0"/>
+          </p:cNvCxnSpPr>
+          <p:nvPr/>
+        </p:nvCxnSpPr>
+        <p:spPr>
+          <a:xfrm flipH="1">
+            <a:off x="952500" y="2667000"/>
+            <a:ext cx="647700" cy="304800"/>
+          </a:xfrm>
+          <a:prstGeom prst="straightConnector1">
+            <a:avLst/>
+          </a:prstGeom>
+          <a:ln>
+            <a:tailEnd type="arrow"/>
+          </a:ln>
+        </p:spPr>
+        <p:style>
+          <a:lnRef idx="1">
+            <a:schemeClr val="accent1"/>
+          </a:lnRef>
+          <a:fillRef idx="0">
+            <a:schemeClr val="accent1"/>
+          </a:fillRef>
+          <a:effectRef idx="0">
+            <a:schemeClr val="accent1"/>
+          </a:effectRef>
+          <a:fontRef idx="minor">
+            <a:schemeClr val="tx1"/>
+          </a:fontRef>
+        </p:style>
+      </p:cxnSp>
+      <p:cxnSp>
+        <p:nvCxnSpPr>
+          <p:cNvPr id="115" name="Straight Arrow Connector 114"/>
+          <p:cNvCxnSpPr>
+            <a:stCxn id="111" idx="4"/>
+            <a:endCxn id="50" idx="1"/>
+          </p:cNvCxnSpPr>
+          <p:nvPr/>
+        </p:nvCxnSpPr>
+        <p:spPr>
+          <a:xfrm>
+            <a:off x="952500" y="3505200"/>
+            <a:ext cx="571500" cy="392724"/>
+          </a:xfrm>
+          <a:prstGeom prst="straightConnector1">
+            <a:avLst/>
+          </a:prstGeom>
+          <a:ln>
+            <a:tailEnd type="arrow"/>
+          </a:ln>
+        </p:spPr>
+        <p:style>
+          <a:lnRef idx="1">
+            <a:schemeClr val="accent1"/>
+          </a:lnRef>
+          <a:fillRef idx="0">
+            <a:schemeClr val="accent1"/>
+          </a:fillRef>
+          <a:effectRef idx="0">
+            <a:schemeClr val="accent1"/>
+          </a:effectRef>
+          <a:fontRef idx="minor">
+            <a:schemeClr val="tx1"/>
+          </a:fontRef>
+        </p:style>
+      </p:cxnSp>
     </p:spTree>
   </p:cSld>
   <p:clrMapOvr>

</xml_diff>